<commit_message>
Updated Files for Report
</commit_message>
<xml_diff>
--- a/Basic Beam Slides.pptx
+++ b/Basic Beam Slides.pptx
@@ -6,6 +6,7 @@
   </p:sldMasterIdLst>
   <p:sldIdLst>
     <p:sldId id="256" r:id="rId2"/>
+    <p:sldId id="257" r:id="rId3"/>
   </p:sldIdLst>
   <p:sldSz cx="12192000" cy="6858000"/>
   <p:notesSz cx="6858000" cy="9144000"/>
@@ -104,6 +105,11 @@
       </a:defRPr>
     </a:lvl9pPr>
   </p:defaultTextStyle>
+  <p:extLst>
+    <p:ext uri="{EFAFB233-063F-42B5-8137-9DF3F51BA10A}">
+      <p15:sldGuideLst xmlns:p15="http://schemas.microsoft.com/office/powerpoint/2012/main"/>
+    </p:ext>
+  </p:extLst>
 </p:presentation>
 </file>
 
@@ -152,7 +158,6 @@
               <a:rPr lang="en-US"/>
               <a:t>Click to edit Master title style</a:t>
             </a:r>
-            <a:endParaRPr lang="en-US"/>
           </a:p>
         </p:txBody>
       </p:sp>
@@ -217,7 +222,6 @@
               <a:rPr lang="en-US"/>
               <a:t>Click to edit Master subtitle style</a:t>
             </a:r>
-            <a:endParaRPr lang="en-US"/>
           </a:p>
         </p:txBody>
       </p:sp>
@@ -335,7 +339,6 @@
               <a:rPr lang="en-US"/>
               <a:t>Click to edit Master title style</a:t>
             </a:r>
-            <a:endParaRPr lang="en-US"/>
           </a:p>
         </p:txBody>
       </p:sp>
@@ -387,7 +390,6 @@
               <a:rPr lang="en-US"/>
               <a:t>Fifth level</a:t>
             </a:r>
-            <a:endParaRPr lang="en-US"/>
           </a:p>
         </p:txBody>
       </p:sp>
@@ -510,7 +512,6 @@
               <a:rPr lang="en-US"/>
               <a:t>Click to edit Master title style</a:t>
             </a:r>
-            <a:endParaRPr lang="en-US"/>
           </a:p>
         </p:txBody>
       </p:sp>
@@ -567,7 +568,6 @@
               <a:rPr lang="en-US"/>
               <a:t>Fifth level</a:t>
             </a:r>
-            <a:endParaRPr lang="en-US"/>
           </a:p>
         </p:txBody>
       </p:sp>
@@ -685,7 +685,6 @@
               <a:rPr lang="en-US"/>
               <a:t>Click to edit Master title style</a:t>
             </a:r>
-            <a:endParaRPr lang="en-US"/>
           </a:p>
         </p:txBody>
       </p:sp>
@@ -737,7 +736,6 @@
               <a:rPr lang="en-US"/>
               <a:t>Fifth level</a:t>
             </a:r>
-            <a:endParaRPr lang="en-US"/>
           </a:p>
         </p:txBody>
       </p:sp>
@@ -864,7 +862,6 @@
               <a:rPr lang="en-US"/>
               <a:t>Click to edit Master title style</a:t>
             </a:r>
-            <a:endParaRPr lang="en-US"/>
           </a:p>
         </p:txBody>
       </p:sp>
@@ -1101,7 +1098,6 @@
               <a:rPr lang="en-US"/>
               <a:t>Click to edit Master title style</a:t>
             </a:r>
-            <a:endParaRPr lang="en-US"/>
           </a:p>
         </p:txBody>
       </p:sp>
@@ -1158,7 +1154,6 @@
               <a:rPr lang="en-US"/>
               <a:t>Fifth level</a:t>
             </a:r>
-            <a:endParaRPr lang="en-US"/>
           </a:p>
         </p:txBody>
       </p:sp>
@@ -1215,7 +1210,6 @@
               <a:rPr lang="en-US"/>
               <a:t>Fifth level</a:t>
             </a:r>
-            <a:endParaRPr lang="en-US"/>
           </a:p>
         </p:txBody>
       </p:sp>
@@ -1338,7 +1332,6 @@
               <a:rPr lang="en-US"/>
               <a:t>Click to edit Master title style</a:t>
             </a:r>
-            <a:endParaRPr lang="en-US"/>
           </a:p>
         </p:txBody>
       </p:sp>
@@ -1460,7 +1453,6 @@
               <a:rPr lang="en-US"/>
               <a:t>Fifth level</a:t>
             </a:r>
-            <a:endParaRPr lang="en-US"/>
           </a:p>
         </p:txBody>
       </p:sp>
@@ -1582,7 +1574,6 @@
               <a:rPr lang="en-US"/>
               <a:t>Fifth level</a:t>
             </a:r>
-            <a:endParaRPr lang="en-US"/>
           </a:p>
         </p:txBody>
       </p:sp>
@@ -1700,7 +1691,6 @@
               <a:rPr lang="en-US"/>
               <a:t>Click to edit Master title style</a:t>
             </a:r>
-            <a:endParaRPr lang="en-US"/>
           </a:p>
         </p:txBody>
       </p:sp>
@@ -1922,7 +1912,6 @@
               <a:rPr lang="en-US"/>
               <a:t>Click to edit Master title style</a:t>
             </a:r>
-            <a:endParaRPr lang="en-US"/>
           </a:p>
         </p:txBody>
       </p:sp>
@@ -2007,7 +1996,6 @@
               <a:rPr lang="en-US"/>
               <a:t>Fifth level</a:t>
             </a:r>
-            <a:endParaRPr lang="en-US"/>
           </a:p>
         </p:txBody>
       </p:sp>
@@ -2199,7 +2187,6 @@
               <a:rPr lang="en-US"/>
               <a:t>Click to edit Master title style</a:t>
             </a:r>
-            <a:endParaRPr lang="en-US"/>
           </a:p>
         </p:txBody>
       </p:sp>
@@ -2458,7 +2445,6 @@
               <a:rPr lang="en-US"/>
               <a:t>Click to edit Master title style</a:t>
             </a:r>
-            <a:endParaRPr lang="en-US"/>
           </a:p>
         </p:txBody>
       </p:sp>
@@ -2520,7 +2506,6 @@
               <a:rPr lang="en-US"/>
               <a:t>Fifth level</a:t>
             </a:r>
-            <a:endParaRPr lang="en-US"/>
           </a:p>
         </p:txBody>
       </p:sp>
@@ -3602,6 +3587,711 @@
 </p:sld>
 </file>
 
+<file path=ppt/slides/slide2.xml><?xml version="1.0" encoding="utf-8"?>
+<p:sld xmlns:a="http://schemas.openxmlformats.org/drawingml/2006/main" xmlns:r="http://schemas.openxmlformats.org/officeDocument/2006/relationships" xmlns:p="http://schemas.openxmlformats.org/presentationml/2006/main">
+  <p:cSld>
+    <p:spTree>
+      <p:nvGrpSpPr>
+        <p:cNvPr id="1" name=""/>
+        <p:cNvGrpSpPr/>
+        <p:nvPr/>
+      </p:nvGrpSpPr>
+      <p:grpSpPr>
+        <a:xfrm>
+          <a:off x="0" y="0"/>
+          <a:ext cx="0" cy="0"/>
+          <a:chOff x="0" y="0"/>
+          <a:chExt cx="0" cy="0"/>
+        </a:xfrm>
+      </p:grpSpPr>
+      <p:grpSp>
+        <p:nvGrpSpPr>
+          <p:cNvPr id="4" name="Group 3"/>
+          <p:cNvGrpSpPr/>
+          <p:nvPr/>
+        </p:nvGrpSpPr>
+        <p:grpSpPr>
+          <a:xfrm>
+            <a:off x="1590256" y="530088"/>
+            <a:ext cx="10058405" cy="3840320"/>
+            <a:chOff x="1590256" y="530088"/>
+            <a:chExt cx="10058405" cy="3840320"/>
+          </a:xfrm>
+        </p:grpSpPr>
+        <p:grpSp>
+          <p:nvGrpSpPr>
+            <p:cNvPr id="27" name="Group 26"/>
+            <p:cNvGrpSpPr/>
+            <p:nvPr/>
+          </p:nvGrpSpPr>
+          <p:grpSpPr>
+            <a:xfrm>
+              <a:off x="1835427" y="530088"/>
+              <a:ext cx="9813234" cy="3840320"/>
+              <a:chOff x="1835427" y="530088"/>
+              <a:chExt cx="9813234" cy="3840320"/>
+            </a:xfrm>
+          </p:grpSpPr>
+          <p:grpSp>
+            <p:nvGrpSpPr>
+              <p:cNvPr id="25" name="Group 24"/>
+              <p:cNvGrpSpPr/>
+              <p:nvPr/>
+            </p:nvGrpSpPr>
+            <p:grpSpPr>
+              <a:xfrm>
+                <a:off x="1835427" y="530088"/>
+                <a:ext cx="9203634" cy="3763616"/>
+                <a:chOff x="1835427" y="530088"/>
+                <a:chExt cx="9203634" cy="3763616"/>
+              </a:xfrm>
+            </p:grpSpPr>
+            <p:cxnSp>
+              <p:nvCxnSpPr>
+                <p:cNvPr id="7" name="Straight Connector 6"/>
+                <p:cNvCxnSpPr/>
+                <p:nvPr/>
+              </p:nvCxnSpPr>
+              <p:spPr>
+                <a:xfrm>
+                  <a:off x="2093843" y="1550504"/>
+                  <a:ext cx="0" cy="2743200"/>
+                </a:xfrm>
+                <a:prstGeom prst="line">
+                  <a:avLst/>
+                </a:prstGeom>
+                <a:ln>
+                  <a:solidFill>
+                    <a:schemeClr val="tx1"/>
+                  </a:solidFill>
+                </a:ln>
+              </p:spPr>
+              <p:style>
+                <a:lnRef idx="1">
+                  <a:schemeClr val="accent1"/>
+                </a:lnRef>
+                <a:fillRef idx="0">
+                  <a:schemeClr val="accent1"/>
+                </a:fillRef>
+                <a:effectRef idx="0">
+                  <a:schemeClr val="accent1"/>
+                </a:effectRef>
+                <a:fontRef idx="minor">
+                  <a:schemeClr val="tx1"/>
+                </a:fontRef>
+              </p:style>
+            </p:cxnSp>
+            <p:cxnSp>
+              <p:nvCxnSpPr>
+                <p:cNvPr id="9" name="Straight Connector 8"/>
+                <p:cNvCxnSpPr/>
+                <p:nvPr/>
+              </p:nvCxnSpPr>
+              <p:spPr>
+                <a:xfrm flipH="1">
+                  <a:off x="1842052" y="1722783"/>
+                  <a:ext cx="251791" cy="225287"/>
+                </a:xfrm>
+                <a:prstGeom prst="line">
+                  <a:avLst/>
+                </a:prstGeom>
+                <a:ln>
+                  <a:solidFill>
+                    <a:schemeClr val="tx1"/>
+                  </a:solidFill>
+                </a:ln>
+              </p:spPr>
+              <p:style>
+                <a:lnRef idx="1">
+                  <a:schemeClr val="accent1"/>
+                </a:lnRef>
+                <a:fillRef idx="0">
+                  <a:schemeClr val="accent1"/>
+                </a:fillRef>
+                <a:effectRef idx="0">
+                  <a:schemeClr val="accent1"/>
+                </a:effectRef>
+                <a:fontRef idx="minor">
+                  <a:schemeClr val="tx1"/>
+                </a:fontRef>
+              </p:style>
+            </p:cxnSp>
+            <p:cxnSp>
+              <p:nvCxnSpPr>
+                <p:cNvPr id="10" name="Straight Connector 9"/>
+                <p:cNvCxnSpPr/>
+                <p:nvPr/>
+              </p:nvCxnSpPr>
+              <p:spPr>
+                <a:xfrm flipH="1">
+                  <a:off x="1835427" y="2829341"/>
+                  <a:ext cx="251791" cy="225287"/>
+                </a:xfrm>
+                <a:prstGeom prst="line">
+                  <a:avLst/>
+                </a:prstGeom>
+                <a:ln>
+                  <a:solidFill>
+                    <a:schemeClr val="tx1"/>
+                  </a:solidFill>
+                </a:ln>
+              </p:spPr>
+              <p:style>
+                <a:lnRef idx="1">
+                  <a:schemeClr val="accent1"/>
+                </a:lnRef>
+                <a:fillRef idx="0">
+                  <a:schemeClr val="accent1"/>
+                </a:fillRef>
+                <a:effectRef idx="0">
+                  <a:schemeClr val="accent1"/>
+                </a:effectRef>
+                <a:fontRef idx="minor">
+                  <a:schemeClr val="tx1"/>
+                </a:fontRef>
+              </p:style>
+            </p:cxnSp>
+            <p:cxnSp>
+              <p:nvCxnSpPr>
+                <p:cNvPr id="11" name="Straight Connector 10"/>
+                <p:cNvCxnSpPr/>
+                <p:nvPr/>
+              </p:nvCxnSpPr>
+              <p:spPr>
+                <a:xfrm flipH="1">
+                  <a:off x="1835427" y="3200396"/>
+                  <a:ext cx="251791" cy="225287"/>
+                </a:xfrm>
+                <a:prstGeom prst="line">
+                  <a:avLst/>
+                </a:prstGeom>
+                <a:ln>
+                  <a:solidFill>
+                    <a:schemeClr val="tx1"/>
+                  </a:solidFill>
+                </a:ln>
+              </p:spPr>
+              <p:style>
+                <a:lnRef idx="1">
+                  <a:schemeClr val="accent1"/>
+                </a:lnRef>
+                <a:fillRef idx="0">
+                  <a:schemeClr val="accent1"/>
+                </a:fillRef>
+                <a:effectRef idx="0">
+                  <a:schemeClr val="accent1"/>
+                </a:effectRef>
+                <a:fontRef idx="minor">
+                  <a:schemeClr val="tx1"/>
+                </a:fontRef>
+              </p:style>
+            </p:cxnSp>
+            <p:cxnSp>
+              <p:nvCxnSpPr>
+                <p:cNvPr id="12" name="Straight Connector 11"/>
+                <p:cNvCxnSpPr/>
+                <p:nvPr/>
+              </p:nvCxnSpPr>
+              <p:spPr>
+                <a:xfrm flipH="1">
+                  <a:off x="1848678" y="3544957"/>
+                  <a:ext cx="251791" cy="225287"/>
+                </a:xfrm>
+                <a:prstGeom prst="line">
+                  <a:avLst/>
+                </a:prstGeom>
+                <a:ln>
+                  <a:solidFill>
+                    <a:schemeClr val="tx1"/>
+                  </a:solidFill>
+                </a:ln>
+              </p:spPr>
+              <p:style>
+                <a:lnRef idx="1">
+                  <a:schemeClr val="accent1"/>
+                </a:lnRef>
+                <a:fillRef idx="0">
+                  <a:schemeClr val="accent1"/>
+                </a:fillRef>
+                <a:effectRef idx="0">
+                  <a:schemeClr val="accent1"/>
+                </a:effectRef>
+                <a:fontRef idx="minor">
+                  <a:schemeClr val="tx1"/>
+                </a:fontRef>
+              </p:style>
+            </p:cxnSp>
+            <p:cxnSp>
+              <p:nvCxnSpPr>
+                <p:cNvPr id="13" name="Straight Connector 12"/>
+                <p:cNvCxnSpPr/>
+                <p:nvPr/>
+              </p:nvCxnSpPr>
+              <p:spPr>
+                <a:xfrm flipH="1">
+                  <a:off x="1835427" y="3942520"/>
+                  <a:ext cx="251791" cy="225287"/>
+                </a:xfrm>
+                <a:prstGeom prst="line">
+                  <a:avLst/>
+                </a:prstGeom>
+                <a:ln>
+                  <a:solidFill>
+                    <a:schemeClr val="tx1"/>
+                  </a:solidFill>
+                </a:ln>
+              </p:spPr>
+              <p:style>
+                <a:lnRef idx="1">
+                  <a:schemeClr val="accent1"/>
+                </a:lnRef>
+                <a:fillRef idx="0">
+                  <a:schemeClr val="accent1"/>
+                </a:fillRef>
+                <a:effectRef idx="0">
+                  <a:schemeClr val="accent1"/>
+                </a:effectRef>
+                <a:fontRef idx="minor">
+                  <a:schemeClr val="tx1"/>
+                </a:fontRef>
+              </p:style>
+            </p:cxnSp>
+            <p:cxnSp>
+              <p:nvCxnSpPr>
+                <p:cNvPr id="14" name="Straight Connector 13"/>
+                <p:cNvCxnSpPr/>
+                <p:nvPr/>
+              </p:nvCxnSpPr>
+              <p:spPr>
+                <a:xfrm flipH="1">
+                  <a:off x="1835427" y="2431776"/>
+                  <a:ext cx="251791" cy="225287"/>
+                </a:xfrm>
+                <a:prstGeom prst="line">
+                  <a:avLst/>
+                </a:prstGeom>
+                <a:ln>
+                  <a:solidFill>
+                    <a:schemeClr val="tx1"/>
+                  </a:solidFill>
+                </a:ln>
+              </p:spPr>
+              <p:style>
+                <a:lnRef idx="1">
+                  <a:schemeClr val="accent1"/>
+                </a:lnRef>
+                <a:fillRef idx="0">
+                  <a:schemeClr val="accent1"/>
+                </a:fillRef>
+                <a:effectRef idx="0">
+                  <a:schemeClr val="accent1"/>
+                </a:effectRef>
+                <a:fontRef idx="minor">
+                  <a:schemeClr val="tx1"/>
+                </a:fontRef>
+              </p:style>
+            </p:cxnSp>
+            <p:cxnSp>
+              <p:nvCxnSpPr>
+                <p:cNvPr id="15" name="Straight Connector 14"/>
+                <p:cNvCxnSpPr/>
+                <p:nvPr/>
+              </p:nvCxnSpPr>
+              <p:spPr>
+                <a:xfrm flipH="1">
+                  <a:off x="1842054" y="2073963"/>
+                  <a:ext cx="251791" cy="225287"/>
+                </a:xfrm>
+                <a:prstGeom prst="line">
+                  <a:avLst/>
+                </a:prstGeom>
+                <a:ln>
+                  <a:solidFill>
+                    <a:schemeClr val="tx1"/>
+                  </a:solidFill>
+                </a:ln>
+              </p:spPr>
+              <p:style>
+                <a:lnRef idx="1">
+                  <a:schemeClr val="accent1"/>
+                </a:lnRef>
+                <a:fillRef idx="0">
+                  <a:schemeClr val="accent1"/>
+                </a:fillRef>
+                <a:effectRef idx="0">
+                  <a:schemeClr val="accent1"/>
+                </a:effectRef>
+                <a:fontRef idx="minor">
+                  <a:schemeClr val="tx1"/>
+                </a:fontRef>
+              </p:style>
+            </p:cxnSp>
+            <p:cxnSp>
+              <p:nvCxnSpPr>
+                <p:cNvPr id="18" name="Straight Arrow Connector 17"/>
+                <p:cNvCxnSpPr/>
+                <p:nvPr/>
+              </p:nvCxnSpPr>
+              <p:spPr>
+                <a:xfrm flipH="1">
+                  <a:off x="9150628" y="914400"/>
+                  <a:ext cx="6624" cy="1742663"/>
+                </a:xfrm>
+                <a:prstGeom prst="straightConnector1">
+                  <a:avLst/>
+                </a:prstGeom>
+                <a:ln w="57150">
+                  <a:solidFill>
+                    <a:srgbClr val="FF0000"/>
+                  </a:solidFill>
+                  <a:tailEnd type="triangle"/>
+                </a:ln>
+              </p:spPr>
+              <p:style>
+                <a:lnRef idx="1">
+                  <a:schemeClr val="accent1"/>
+                </a:lnRef>
+                <a:fillRef idx="0">
+                  <a:schemeClr val="accent1"/>
+                </a:fillRef>
+                <a:effectRef idx="0">
+                  <a:schemeClr val="accent1"/>
+                </a:effectRef>
+                <a:fontRef idx="minor">
+                  <a:schemeClr val="tx1"/>
+                </a:fontRef>
+              </p:style>
+            </p:cxnSp>
+            <p:sp>
+              <p:nvSpPr>
+                <p:cNvPr id="19" name="TextBox 18"/>
+                <p:cNvSpPr txBox="1"/>
+                <p:nvPr/>
+              </p:nvSpPr>
+              <p:spPr>
+                <a:xfrm>
+                  <a:off x="8693430" y="530088"/>
+                  <a:ext cx="1702904" cy="461665"/>
+                </a:xfrm>
+                <a:prstGeom prst="rect">
+                  <a:avLst/>
+                </a:prstGeom>
+                <a:noFill/>
+              </p:spPr>
+              <p:txBody>
+                <a:bodyPr wrap="square" rtlCol="0">
+                  <a:spAutoFit/>
+                </a:bodyPr>
+                <a:lstStyle/>
+                <a:p>
+                  <a:r>
+                    <a:rPr lang="en-US" sz="2400" dirty="0"/>
+                    <a:t>P = 10N</a:t>
+                  </a:r>
+                </a:p>
+              </p:txBody>
+            </p:sp>
+            <p:sp>
+              <p:nvSpPr>
+                <p:cNvPr id="20" name="TextBox 19"/>
+                <p:cNvSpPr txBox="1"/>
+                <p:nvPr/>
+              </p:nvSpPr>
+              <p:spPr>
+                <a:xfrm>
+                  <a:off x="9150628" y="2630562"/>
+                  <a:ext cx="629482" cy="461665"/>
+                </a:xfrm>
+                <a:prstGeom prst="rect">
+                  <a:avLst/>
+                </a:prstGeom>
+                <a:noFill/>
+              </p:spPr>
+              <p:txBody>
+                <a:bodyPr wrap="square" rtlCol="0">
+                  <a:spAutoFit/>
+                </a:bodyPr>
+                <a:lstStyle/>
+                <a:p>
+                  <a:r>
+                    <a:rPr lang="en-US" sz="2400" dirty="0"/>
+                    <a:t>t2</a:t>
+                  </a:r>
+                </a:p>
+              </p:txBody>
+            </p:sp>
+            <p:sp>
+              <p:nvSpPr>
+                <p:cNvPr id="21" name="Rectangle 20"/>
+                <p:cNvSpPr/>
+                <p:nvPr/>
+              </p:nvSpPr>
+              <p:spPr>
+                <a:xfrm>
+                  <a:off x="10098157" y="2431770"/>
+                  <a:ext cx="940904" cy="881269"/>
+                </a:xfrm>
+                <a:prstGeom prst="rect">
+                  <a:avLst/>
+                </a:prstGeom>
+                <a:solidFill>
+                  <a:schemeClr val="tx1"/>
+                </a:solidFill>
+                <a:ln>
+                  <a:solidFill>
+                    <a:schemeClr val="tx1"/>
+                  </a:solidFill>
+                </a:ln>
+              </p:spPr>
+              <p:style>
+                <a:lnRef idx="2">
+                  <a:schemeClr val="accent1">
+                    <a:shade val="50000"/>
+                  </a:schemeClr>
+                </a:lnRef>
+                <a:fillRef idx="1">
+                  <a:schemeClr val="accent1"/>
+                </a:fillRef>
+                <a:effectRef idx="0">
+                  <a:schemeClr val="accent1"/>
+                </a:effectRef>
+                <a:fontRef idx="minor">
+                  <a:schemeClr val="lt1"/>
+                </a:fontRef>
+              </p:style>
+              <p:txBody>
+                <a:bodyPr rtlCol="0" anchor="ctr"/>
+                <a:lstStyle/>
+                <a:p>
+                  <a:pPr algn="ctr"/>
+                  <a:endParaRPr lang="en-US">
+                    <a:ln>
+                      <a:solidFill>
+                        <a:sysClr val="windowText" lastClr="000000"/>
+                      </a:solidFill>
+                    </a:ln>
+                    <a:solidFill>
+                      <a:sysClr val="windowText" lastClr="000000"/>
+                    </a:solidFill>
+                  </a:endParaRPr>
+                </a:p>
+              </p:txBody>
+            </p:sp>
+            <p:sp>
+              <p:nvSpPr>
+                <p:cNvPr id="22" name="TextBox 21"/>
+                <p:cNvSpPr txBox="1"/>
+                <p:nvPr/>
+              </p:nvSpPr>
+              <p:spPr>
+                <a:xfrm>
+                  <a:off x="9819864" y="2637190"/>
+                  <a:ext cx="238539" cy="461665"/>
+                </a:xfrm>
+                <a:prstGeom prst="rect">
+                  <a:avLst/>
+                </a:prstGeom>
+                <a:noFill/>
+              </p:spPr>
+              <p:txBody>
+                <a:bodyPr wrap="square" rtlCol="0">
+                  <a:spAutoFit/>
+                </a:bodyPr>
+                <a:lstStyle/>
+                <a:p>
+                  <a:r>
+                    <a:rPr lang="en-US" sz="2400" dirty="0"/>
+                    <a:t>t</a:t>
+                  </a:r>
+                </a:p>
+              </p:txBody>
+            </p:sp>
+            <p:sp>
+              <p:nvSpPr>
+                <p:cNvPr id="23" name="TextBox 22"/>
+                <p:cNvSpPr txBox="1"/>
+                <p:nvPr/>
+              </p:nvSpPr>
+              <p:spPr>
+                <a:xfrm>
+                  <a:off x="10449339" y="1955773"/>
+                  <a:ext cx="238539" cy="461665"/>
+                </a:xfrm>
+                <a:prstGeom prst="rect">
+                  <a:avLst/>
+                </a:prstGeom>
+                <a:noFill/>
+              </p:spPr>
+              <p:txBody>
+                <a:bodyPr wrap="square" rtlCol="0">
+                  <a:spAutoFit/>
+                </a:bodyPr>
+                <a:lstStyle/>
+                <a:p>
+                  <a:r>
+                    <a:rPr lang="en-US" sz="2400" dirty="0"/>
+                    <a:t>t</a:t>
+                  </a:r>
+                </a:p>
+              </p:txBody>
+            </p:sp>
+            <p:sp>
+              <p:nvSpPr>
+                <p:cNvPr id="24" name="TextBox 23"/>
+                <p:cNvSpPr txBox="1"/>
+                <p:nvPr/>
+              </p:nvSpPr>
+              <p:spPr>
+                <a:xfrm>
+                  <a:off x="5390321" y="3378220"/>
+                  <a:ext cx="1368288" cy="461665"/>
+                </a:xfrm>
+                <a:prstGeom prst="rect">
+                  <a:avLst/>
+                </a:prstGeom>
+                <a:noFill/>
+              </p:spPr>
+              <p:txBody>
+                <a:bodyPr wrap="square" rtlCol="0">
+                  <a:spAutoFit/>
+                </a:bodyPr>
+                <a:lstStyle/>
+                <a:p>
+                  <a:r>
+                    <a:rPr lang="en-US" sz="2400" dirty="0"/>
+                    <a:t>L = 1m</a:t>
+                  </a:r>
+                </a:p>
+              </p:txBody>
+            </p:sp>
+          </p:grpSp>
+          <p:sp>
+            <p:nvSpPr>
+              <p:cNvPr id="26" name="TextBox 25"/>
+              <p:cNvSpPr txBox="1"/>
+              <p:nvPr/>
+            </p:nvSpPr>
+            <p:spPr>
+              <a:xfrm>
+                <a:off x="9929191" y="3539411"/>
+                <a:ext cx="1719470" cy="830997"/>
+              </a:xfrm>
+              <a:prstGeom prst="rect">
+                <a:avLst/>
+              </a:prstGeom>
+              <a:noFill/>
+            </p:spPr>
+            <p:txBody>
+              <a:bodyPr wrap="square" rtlCol="0">
+                <a:spAutoFit/>
+              </a:bodyPr>
+              <a:lstStyle/>
+              <a:p>
+                <a:r>
+                  <a:rPr lang="en-US" sz="2400" dirty="0"/>
+                  <a:t>t1 = 0.01m</a:t>
+                </a:r>
+              </a:p>
+              <a:p>
+                <a:r>
+                  <a:rPr lang="en-US" sz="2400" dirty="0"/>
+                  <a:t>t2 = 0.005m </a:t>
+                </a:r>
+              </a:p>
+            </p:txBody>
+          </p:sp>
+        </p:grpSp>
+        <p:sp>
+          <p:nvSpPr>
+            <p:cNvPr id="2" name="Trapezoid 1"/>
+            <p:cNvSpPr/>
+            <p:nvPr/>
+          </p:nvSpPr>
+          <p:spPr>
+            <a:xfrm rot="5400000">
+              <a:off x="5332339" y="-604635"/>
+              <a:ext cx="530100" cy="7026970"/>
+            </a:xfrm>
+            <a:prstGeom prst="trapezoid">
+              <a:avLst/>
+            </a:prstGeom>
+            <a:solidFill>
+              <a:schemeClr val="tx1"/>
+            </a:solidFill>
+            <a:ln>
+              <a:solidFill>
+                <a:schemeClr val="tx1"/>
+              </a:solidFill>
+            </a:ln>
+          </p:spPr>
+          <p:style>
+            <a:lnRef idx="2">
+              <a:schemeClr val="accent1">
+                <a:shade val="50000"/>
+              </a:schemeClr>
+            </a:lnRef>
+            <a:fillRef idx="1">
+              <a:schemeClr val="accent1"/>
+            </a:fillRef>
+            <a:effectRef idx="0">
+              <a:schemeClr val="accent1"/>
+            </a:effectRef>
+            <a:fontRef idx="minor">
+              <a:schemeClr val="lt1"/>
+            </a:fontRef>
+          </p:style>
+          <p:txBody>
+            <a:bodyPr rtlCol="0" anchor="ctr"/>
+            <a:lstStyle/>
+            <a:p>
+              <a:pPr algn="ctr"/>
+              <a:endParaRPr lang="en-US"/>
+            </a:p>
+          </p:txBody>
+        </p:sp>
+        <p:sp>
+          <p:nvSpPr>
+            <p:cNvPr id="28" name="TextBox 27"/>
+            <p:cNvSpPr txBox="1"/>
+            <p:nvPr/>
+          </p:nvSpPr>
+          <p:spPr>
+            <a:xfrm>
+              <a:off x="1590256" y="2650440"/>
+              <a:ext cx="629482" cy="461665"/>
+            </a:xfrm>
+            <a:prstGeom prst="rect">
+              <a:avLst/>
+            </a:prstGeom>
+            <a:noFill/>
+          </p:spPr>
+          <p:txBody>
+            <a:bodyPr wrap="square" rtlCol="0">
+              <a:spAutoFit/>
+            </a:bodyPr>
+            <a:lstStyle/>
+            <a:p>
+              <a:r>
+                <a:rPr lang="en-US" sz="2400" dirty="0"/>
+                <a:t>t1</a:t>
+              </a:r>
+            </a:p>
+          </p:txBody>
+        </p:sp>
+      </p:grpSp>
+    </p:spTree>
+    <p:extLst>
+      <p:ext uri="{BB962C8B-B14F-4D97-AF65-F5344CB8AC3E}">
+        <p14:creationId xmlns:p14="http://schemas.microsoft.com/office/powerpoint/2010/main" val="2121328893"/>
+      </p:ext>
+    </p:extLst>
+  </p:cSld>
+  <p:clrMapOvr>
+    <a:masterClrMapping/>
+  </p:clrMapOvr>
+</p:sld>
+</file>
+
 <file path=ppt/theme/theme1.xml><?xml version="1.0" encoding="utf-8"?>
 <a:theme xmlns:a="http://schemas.openxmlformats.org/drawingml/2006/main" name="Office Theme">
   <a:themeElements>

</xml_diff>